<commit_message>
added problematic sleep inertia + landscape figure sleep stage
</commit_message>
<xml_diff>
--- a/Fig/Intro/Intro_Pyramid_dream_construction/Intro_pyramid_dream.pptx
+++ b/Fig/Intro/Intro_Pyramid_dream_construction/Intro_pyramid_dream.pptx
@@ -5,7 +5,8 @@
     <p:sldMasterId id="2147483672" r:id="rId1"/>
   </p:sldMasterIdLst>
   <p:sldIdLst>
-    <p:sldId id="256" r:id="rId2"/>
+    <p:sldId id="257" r:id="rId2"/>
+    <p:sldId id="256" r:id="rId3"/>
   </p:sldIdLst>
   <p:sldSz cx="6858000" cy="9906000" type="A4"/>
   <p:notesSz cx="6858000" cy="9144000"/>
@@ -1349,6 +1350,13 @@
         </dgm:presLayoutVars>
       </dgm:prSet>
       <dgm:spPr/>
+      <dgm:t>
+        <a:bodyPr/>
+        <a:lstStyle/>
+        <a:p>
+          <a:endParaRPr lang="en-US"/>
+        </a:p>
+      </dgm:t>
     </dgm:pt>
     <dgm:pt modelId="{82BD76D1-B935-4AE2-9826-E9E12AFF1282}" type="pres">
       <dgm:prSet presAssocID="{A0A06B6F-48C4-4E01-B392-751A0A0D8992}" presName="aSpace" presStyleCnt="0"/>
@@ -1361,6 +1369,13 @@
         </dgm:presLayoutVars>
       </dgm:prSet>
       <dgm:spPr/>
+      <dgm:t>
+        <a:bodyPr/>
+        <a:lstStyle/>
+        <a:p>
+          <a:endParaRPr lang="en-US"/>
+        </a:p>
+      </dgm:t>
     </dgm:pt>
     <dgm:pt modelId="{01DDB01A-3F7A-46E9-A507-A79FC8916FD5}" type="pres">
       <dgm:prSet presAssocID="{B9DF6A28-3F87-4028-85CB-D10ABA1F0A20}" presName="aSpace" presStyleCnt="0"/>
@@ -1373,6 +1388,13 @@
         </dgm:presLayoutVars>
       </dgm:prSet>
       <dgm:spPr/>
+      <dgm:t>
+        <a:bodyPr/>
+        <a:lstStyle/>
+        <a:p>
+          <a:endParaRPr lang="en-US"/>
+        </a:p>
+      </dgm:t>
     </dgm:pt>
     <dgm:pt modelId="{8F0FDF23-D1B2-4926-AC9F-53CE6653935F}" type="pres">
       <dgm:prSet presAssocID="{DBFBE3A3-5989-4B44-8F35-03805B06448E}" presName="aSpace" presStyleCnt="0"/>
@@ -1385,6 +1407,13 @@
         </dgm:presLayoutVars>
       </dgm:prSet>
       <dgm:spPr/>
+      <dgm:t>
+        <a:bodyPr/>
+        <a:lstStyle/>
+        <a:p>
+          <a:endParaRPr lang="en-US"/>
+        </a:p>
+      </dgm:t>
     </dgm:pt>
     <dgm:pt modelId="{61921B82-B06F-44F2-8A8A-F6972103F9A5}" type="pres">
       <dgm:prSet presAssocID="{125E68BC-F7FB-43E2-AD26-07542F0FCDD3}" presName="aSpace" presStyleCnt="0"/>
@@ -1397,6 +1426,13 @@
         </dgm:presLayoutVars>
       </dgm:prSet>
       <dgm:spPr/>
+      <dgm:t>
+        <a:bodyPr/>
+        <a:lstStyle/>
+        <a:p>
+          <a:endParaRPr lang="en-US"/>
+        </a:p>
+      </dgm:t>
     </dgm:pt>
     <dgm:pt modelId="{4156735C-347E-44F2-BE8A-E7B89E449713}" type="pres">
       <dgm:prSet presAssocID="{0F0E0FE0-DB34-4B0D-84F5-0B07854FAEC5}" presName="aSpace" presStyleCnt="0"/>
@@ -1409,6 +1445,13 @@
         </dgm:presLayoutVars>
       </dgm:prSet>
       <dgm:spPr/>
+      <dgm:t>
+        <a:bodyPr/>
+        <a:lstStyle/>
+        <a:p>
+          <a:endParaRPr lang="en-US"/>
+        </a:p>
+      </dgm:t>
     </dgm:pt>
     <dgm:pt modelId="{CE68CE2F-102D-4341-B7D7-FDE4B9982E52}" type="pres">
       <dgm:prSet presAssocID="{32807E3F-4186-4FDF-BAE7-DCA2B46B4E16}" presName="aSpace" presStyleCnt="0"/>
@@ -1421,6 +1464,13 @@
         </dgm:presLayoutVars>
       </dgm:prSet>
       <dgm:spPr/>
+      <dgm:t>
+        <a:bodyPr/>
+        <a:lstStyle/>
+        <a:p>
+          <a:endParaRPr lang="en-US"/>
+        </a:p>
+      </dgm:t>
     </dgm:pt>
     <dgm:pt modelId="{564112F7-17F5-423D-A39C-5350524DC124}" type="pres">
       <dgm:prSet presAssocID="{12741883-265D-4378-8896-3250F04BC96B}" presName="aSpace" presStyleCnt="0"/>
@@ -1428,21 +1478,21 @@
     </dgm:pt>
   </dgm:ptLst>
   <dgm:cxnLst>
+    <dgm:cxn modelId="{79579A44-D21D-4361-9636-340CE9791463}" srcId="{27839B8F-3724-4D62-9180-29E79A7A26E5}" destId="{B9DF6A28-3F87-4028-85CB-D10ABA1F0A20}" srcOrd="1" destOrd="0" parTransId="{B5E633EB-7F5D-4A9D-8CE9-63C925EE2776}" sibTransId="{071073FD-D620-45B7-B92A-95A14B0E0B32}"/>
+    <dgm:cxn modelId="{9C6D455A-3F40-49EF-9539-3CD7BE9D3C28}" type="presOf" srcId="{A0A06B6F-48C4-4E01-B392-751A0A0D8992}" destId="{4301216F-13E4-4E16-A50D-39D6EBC27318}" srcOrd="0" destOrd="0" presId="urn:microsoft.com/office/officeart/2005/8/layout/pyramid2"/>
+    <dgm:cxn modelId="{FB9A3C8D-42A6-4CF6-B4E8-19DB47D3D136}" type="presOf" srcId="{B9DF6A28-3F87-4028-85CB-D10ABA1F0A20}" destId="{F9C17BAB-7FFF-4DE9-B179-DE429845E549}" srcOrd="0" destOrd="0" presId="urn:microsoft.com/office/officeart/2005/8/layout/pyramid2"/>
+    <dgm:cxn modelId="{B4822F75-2DD9-4587-847F-13D470984AFB}" srcId="{27839B8F-3724-4D62-9180-29E79A7A26E5}" destId="{0F0E0FE0-DB34-4B0D-84F5-0B07854FAEC5}" srcOrd="4" destOrd="0" parTransId="{148263D2-8609-4345-B883-B30FB9DDCCAA}" sibTransId="{A933B9AE-C41F-454F-91A9-090FC404E0DA}"/>
+    <dgm:cxn modelId="{8F58ABC4-C0D1-4C85-8A46-DC0255DCE35B}" srcId="{27839B8F-3724-4D62-9180-29E79A7A26E5}" destId="{A0A06B6F-48C4-4E01-B392-751A0A0D8992}" srcOrd="0" destOrd="0" parTransId="{BF526928-1E6F-42E7-8498-B5E7D8126562}" sibTransId="{9A45FB4F-E4BD-40BC-90AB-B1022FA8B3D2}"/>
+    <dgm:cxn modelId="{27D07D7F-2E52-4A1A-B5D4-FB4FA9B64589}" type="presOf" srcId="{0F0E0FE0-DB34-4B0D-84F5-0B07854FAEC5}" destId="{1187B6D0-95FF-4815-8908-8209FC026C04}" srcOrd="0" destOrd="0" presId="urn:microsoft.com/office/officeart/2005/8/layout/pyramid2"/>
+    <dgm:cxn modelId="{14924348-6B02-4EFD-A4E1-63425A6D0883}" type="presOf" srcId="{27839B8F-3724-4D62-9180-29E79A7A26E5}" destId="{68E16A08-5329-479D-93E9-FF4ED5A71598}" srcOrd="0" destOrd="0" presId="urn:microsoft.com/office/officeart/2005/8/layout/pyramid2"/>
+    <dgm:cxn modelId="{A8B428D1-0CB2-4593-8D05-04A530D4B04A}" type="presOf" srcId="{125E68BC-F7FB-43E2-AD26-07542F0FCDD3}" destId="{9B925A78-5840-4717-B2A8-446714F9F6D1}" srcOrd="0" destOrd="0" presId="urn:microsoft.com/office/officeart/2005/8/layout/pyramid2"/>
+    <dgm:cxn modelId="{1A048F70-2BA1-45CD-9EE3-E6A6979D806C}" srcId="{27839B8F-3724-4D62-9180-29E79A7A26E5}" destId="{DBFBE3A3-5989-4B44-8F35-03805B06448E}" srcOrd="2" destOrd="0" parTransId="{F83564DB-A758-413B-B3D1-D49E0C391EB5}" sibTransId="{0E8B830E-9858-43A4-A0BA-C5E01F5D66BC}"/>
+    <dgm:cxn modelId="{828A080D-02ED-4709-9583-94785178D7CA}" srcId="{27839B8F-3724-4D62-9180-29E79A7A26E5}" destId="{125E68BC-F7FB-43E2-AD26-07542F0FCDD3}" srcOrd="3" destOrd="0" parTransId="{EAB5A535-75A4-4737-A7A9-4FA1D39F9248}" sibTransId="{E520C3A0-0BB9-4FED-8008-CDECAEB919CE}"/>
+    <dgm:cxn modelId="{4194786E-7195-4941-BC09-ECFC9B514B0B}" srcId="{27839B8F-3724-4D62-9180-29E79A7A26E5}" destId="{32807E3F-4186-4FDF-BAE7-DCA2B46B4E16}" srcOrd="5" destOrd="0" parTransId="{2C4506FD-E119-4350-9A3B-9F2C78AF9366}" sibTransId="{B2FEC630-6BC8-4F99-9896-EA0B33DDF4FA}"/>
+    <dgm:cxn modelId="{8DF75D0C-47E8-44E0-B98D-6CB8BD336255}" type="presOf" srcId="{12741883-265D-4378-8896-3250F04BC96B}" destId="{DA96F333-EE98-489A-979B-E28231987E16}" srcOrd="0" destOrd="0" presId="urn:microsoft.com/office/officeart/2005/8/layout/pyramid2"/>
+    <dgm:cxn modelId="{C99A353B-50E8-4CC6-AD49-85BF89B21720}" type="presOf" srcId="{DBFBE3A3-5989-4B44-8F35-03805B06448E}" destId="{F2811051-B329-492F-B986-6C8E22BC00EE}" srcOrd="0" destOrd="0" presId="urn:microsoft.com/office/officeart/2005/8/layout/pyramid2"/>
+    <dgm:cxn modelId="{A953A331-F352-422C-B943-7F47D5206419}" type="presOf" srcId="{32807E3F-4186-4FDF-BAE7-DCA2B46B4E16}" destId="{2C2FF811-C249-4B4C-97FE-669B87887142}" srcOrd="0" destOrd="0" presId="urn:microsoft.com/office/officeart/2005/8/layout/pyramid2"/>
     <dgm:cxn modelId="{772EBF9C-CC72-45F0-BDEB-DA57612B5707}" srcId="{27839B8F-3724-4D62-9180-29E79A7A26E5}" destId="{12741883-265D-4378-8896-3250F04BC96B}" srcOrd="6" destOrd="0" parTransId="{F27B69DC-D0C1-48A0-867F-429FF5B261C1}" sibTransId="{5BB55BD4-F13B-4DCA-92DF-D058B2CE6F0A}"/>
-    <dgm:cxn modelId="{C99A353B-50E8-4CC6-AD49-85BF89B21720}" type="presOf" srcId="{DBFBE3A3-5989-4B44-8F35-03805B06448E}" destId="{F2811051-B329-492F-B986-6C8E22BC00EE}" srcOrd="0" destOrd="0" presId="urn:microsoft.com/office/officeart/2005/8/layout/pyramid2"/>
-    <dgm:cxn modelId="{79579A44-D21D-4361-9636-340CE9791463}" srcId="{27839B8F-3724-4D62-9180-29E79A7A26E5}" destId="{B9DF6A28-3F87-4028-85CB-D10ABA1F0A20}" srcOrd="1" destOrd="0" parTransId="{B5E633EB-7F5D-4A9D-8CE9-63C925EE2776}" sibTransId="{071073FD-D620-45B7-B92A-95A14B0E0B32}"/>
-    <dgm:cxn modelId="{FB9A3C8D-42A6-4CF6-B4E8-19DB47D3D136}" type="presOf" srcId="{B9DF6A28-3F87-4028-85CB-D10ABA1F0A20}" destId="{F9C17BAB-7FFF-4DE9-B179-DE429845E549}" srcOrd="0" destOrd="0" presId="urn:microsoft.com/office/officeart/2005/8/layout/pyramid2"/>
-    <dgm:cxn modelId="{828A080D-02ED-4709-9583-94785178D7CA}" srcId="{27839B8F-3724-4D62-9180-29E79A7A26E5}" destId="{125E68BC-F7FB-43E2-AD26-07542F0FCDD3}" srcOrd="3" destOrd="0" parTransId="{EAB5A535-75A4-4737-A7A9-4FA1D39F9248}" sibTransId="{E520C3A0-0BB9-4FED-8008-CDECAEB919CE}"/>
-    <dgm:cxn modelId="{1A048F70-2BA1-45CD-9EE3-E6A6979D806C}" srcId="{27839B8F-3724-4D62-9180-29E79A7A26E5}" destId="{DBFBE3A3-5989-4B44-8F35-03805B06448E}" srcOrd="2" destOrd="0" parTransId="{F83564DB-A758-413B-B3D1-D49E0C391EB5}" sibTransId="{0E8B830E-9858-43A4-A0BA-C5E01F5D66BC}"/>
-    <dgm:cxn modelId="{14924348-6B02-4EFD-A4E1-63425A6D0883}" type="presOf" srcId="{27839B8F-3724-4D62-9180-29E79A7A26E5}" destId="{68E16A08-5329-479D-93E9-FF4ED5A71598}" srcOrd="0" destOrd="0" presId="urn:microsoft.com/office/officeart/2005/8/layout/pyramid2"/>
-    <dgm:cxn modelId="{27D07D7F-2E52-4A1A-B5D4-FB4FA9B64589}" type="presOf" srcId="{0F0E0FE0-DB34-4B0D-84F5-0B07854FAEC5}" destId="{1187B6D0-95FF-4815-8908-8209FC026C04}" srcOrd="0" destOrd="0" presId="urn:microsoft.com/office/officeart/2005/8/layout/pyramid2"/>
-    <dgm:cxn modelId="{8F58ABC4-C0D1-4C85-8A46-DC0255DCE35B}" srcId="{27839B8F-3724-4D62-9180-29E79A7A26E5}" destId="{A0A06B6F-48C4-4E01-B392-751A0A0D8992}" srcOrd="0" destOrd="0" parTransId="{BF526928-1E6F-42E7-8498-B5E7D8126562}" sibTransId="{9A45FB4F-E4BD-40BC-90AB-B1022FA8B3D2}"/>
-    <dgm:cxn modelId="{9C6D455A-3F40-49EF-9539-3CD7BE9D3C28}" type="presOf" srcId="{A0A06B6F-48C4-4E01-B392-751A0A0D8992}" destId="{4301216F-13E4-4E16-A50D-39D6EBC27318}" srcOrd="0" destOrd="0" presId="urn:microsoft.com/office/officeart/2005/8/layout/pyramid2"/>
-    <dgm:cxn modelId="{A8B428D1-0CB2-4593-8D05-04A530D4B04A}" type="presOf" srcId="{125E68BC-F7FB-43E2-AD26-07542F0FCDD3}" destId="{9B925A78-5840-4717-B2A8-446714F9F6D1}" srcOrd="0" destOrd="0" presId="urn:microsoft.com/office/officeart/2005/8/layout/pyramid2"/>
-    <dgm:cxn modelId="{B4822F75-2DD9-4587-847F-13D470984AFB}" srcId="{27839B8F-3724-4D62-9180-29E79A7A26E5}" destId="{0F0E0FE0-DB34-4B0D-84F5-0B07854FAEC5}" srcOrd="4" destOrd="0" parTransId="{148263D2-8609-4345-B883-B30FB9DDCCAA}" sibTransId="{A933B9AE-C41F-454F-91A9-090FC404E0DA}"/>
-    <dgm:cxn modelId="{4194786E-7195-4941-BC09-ECFC9B514B0B}" srcId="{27839B8F-3724-4D62-9180-29E79A7A26E5}" destId="{32807E3F-4186-4FDF-BAE7-DCA2B46B4E16}" srcOrd="5" destOrd="0" parTransId="{2C4506FD-E119-4350-9A3B-9F2C78AF9366}" sibTransId="{B2FEC630-6BC8-4F99-9896-EA0B33DDF4FA}"/>
-    <dgm:cxn modelId="{A953A331-F352-422C-B943-7F47D5206419}" type="presOf" srcId="{32807E3F-4186-4FDF-BAE7-DCA2B46B4E16}" destId="{2C2FF811-C249-4B4C-97FE-669B87887142}" srcOrd="0" destOrd="0" presId="urn:microsoft.com/office/officeart/2005/8/layout/pyramid2"/>
-    <dgm:cxn modelId="{8DF75D0C-47E8-44E0-B98D-6CB8BD336255}" type="presOf" srcId="{12741883-265D-4378-8896-3250F04BC96B}" destId="{DA96F333-EE98-489A-979B-E28231987E16}" srcOrd="0" destOrd="0" presId="urn:microsoft.com/office/officeart/2005/8/layout/pyramid2"/>
     <dgm:cxn modelId="{10ED269A-DA85-4D22-A587-C22B93FF28F0}" type="presParOf" srcId="{68E16A08-5329-479D-93E9-FF4ED5A71598}" destId="{49B298C3-754C-4BBC-B359-38E68CF5E772}" srcOrd="0" destOrd="0" presId="urn:microsoft.com/office/officeart/2005/8/layout/pyramid2"/>
     <dgm:cxn modelId="{09AB1950-A803-4A02-B11A-FB117C1B0482}" type="presParOf" srcId="{68E16A08-5329-479D-93E9-FF4ED5A71598}" destId="{2F2CC30F-5389-44CB-8AF9-231272B37A61}" srcOrd="1" destOrd="0" presId="urn:microsoft.com/office/officeart/2005/8/layout/pyramid2"/>
     <dgm:cxn modelId="{4465B43D-432A-4D66-A0A4-34F0E38DAA38}" type="presParOf" srcId="{2F2CC30F-5389-44CB-8AF9-231272B37A61}" destId="{4301216F-13E4-4E16-A50D-39D6EBC27318}" srcOrd="0" destOrd="0" presId="urn:microsoft.com/office/officeart/2005/8/layout/pyramid2"/>
@@ -3352,7 +3402,7 @@
           <a:p>
             <a:fld id="{57320BFE-D24B-4309-91F1-16E777D75168}" type="datetimeFigureOut">
               <a:rPr lang="en-US" smtClean="0"/>
-              <a:t>8/16/2017</a:t>
+              <a:t>9/16/2017</a:t>
             </a:fld>
             <a:endParaRPr lang="en-US"/>
           </a:p>
@@ -3522,7 +3572,7 @@
           <a:p>
             <a:fld id="{57320BFE-D24B-4309-91F1-16E777D75168}" type="datetimeFigureOut">
               <a:rPr lang="en-US" smtClean="0"/>
-              <a:t>8/16/2017</a:t>
+              <a:t>9/16/2017</a:t>
             </a:fld>
             <a:endParaRPr lang="en-US"/>
           </a:p>
@@ -3702,7 +3752,7 @@
           <a:p>
             <a:fld id="{57320BFE-D24B-4309-91F1-16E777D75168}" type="datetimeFigureOut">
               <a:rPr lang="en-US" smtClean="0"/>
-              <a:t>8/16/2017</a:t>
+              <a:t>9/16/2017</a:t>
             </a:fld>
             <a:endParaRPr lang="en-US"/>
           </a:p>
@@ -3872,7 +3922,7 @@
           <a:p>
             <a:fld id="{57320BFE-D24B-4309-91F1-16E777D75168}" type="datetimeFigureOut">
               <a:rPr lang="en-US" smtClean="0"/>
-              <a:t>8/16/2017</a:t>
+              <a:t>9/16/2017</a:t>
             </a:fld>
             <a:endParaRPr lang="en-US"/>
           </a:p>
@@ -4116,7 +4166,7 @@
           <a:p>
             <a:fld id="{57320BFE-D24B-4309-91F1-16E777D75168}" type="datetimeFigureOut">
               <a:rPr lang="en-US" smtClean="0"/>
-              <a:t>8/16/2017</a:t>
+              <a:t>9/16/2017</a:t>
             </a:fld>
             <a:endParaRPr lang="en-US"/>
           </a:p>
@@ -4348,7 +4398,7 @@
           <a:p>
             <a:fld id="{57320BFE-D24B-4309-91F1-16E777D75168}" type="datetimeFigureOut">
               <a:rPr lang="en-US" smtClean="0"/>
-              <a:t>8/16/2017</a:t>
+              <a:t>9/16/2017</a:t>
             </a:fld>
             <a:endParaRPr lang="en-US"/>
           </a:p>
@@ -4715,7 +4765,7 @@
           <a:p>
             <a:fld id="{57320BFE-D24B-4309-91F1-16E777D75168}" type="datetimeFigureOut">
               <a:rPr lang="en-US" smtClean="0"/>
-              <a:t>8/16/2017</a:t>
+              <a:t>9/16/2017</a:t>
             </a:fld>
             <a:endParaRPr lang="en-US"/>
           </a:p>
@@ -4833,7 +4883,7 @@
           <a:p>
             <a:fld id="{57320BFE-D24B-4309-91F1-16E777D75168}" type="datetimeFigureOut">
               <a:rPr lang="en-US" smtClean="0"/>
-              <a:t>8/16/2017</a:t>
+              <a:t>9/16/2017</a:t>
             </a:fld>
             <a:endParaRPr lang="en-US"/>
           </a:p>
@@ -4928,7 +4978,7 @@
           <a:p>
             <a:fld id="{57320BFE-D24B-4309-91F1-16E777D75168}" type="datetimeFigureOut">
               <a:rPr lang="en-US" smtClean="0"/>
-              <a:t>8/16/2017</a:t>
+              <a:t>9/16/2017</a:t>
             </a:fld>
             <a:endParaRPr lang="en-US"/>
           </a:p>
@@ -5205,7 +5255,7 @@
           <a:p>
             <a:fld id="{57320BFE-D24B-4309-91F1-16E777D75168}" type="datetimeFigureOut">
               <a:rPr lang="en-US" smtClean="0"/>
-              <a:t>8/16/2017</a:t>
+              <a:t>9/16/2017</a:t>
             </a:fld>
             <a:endParaRPr lang="en-US"/>
           </a:p>
@@ -5462,7 +5512,7 @@
           <a:p>
             <a:fld id="{57320BFE-D24B-4309-91F1-16E777D75168}" type="datetimeFigureOut">
               <a:rPr lang="en-US" smtClean="0"/>
-              <a:t>8/16/2017</a:t>
+              <a:t>9/16/2017</a:t>
             </a:fld>
             <a:endParaRPr lang="en-US"/>
           </a:p>
@@ -5675,7 +5725,7 @@
           <a:p>
             <a:fld id="{57320BFE-D24B-4309-91F1-16E777D75168}" type="datetimeFigureOut">
               <a:rPr lang="en-US" smtClean="0"/>
-              <a:t>8/16/2017</a:t>
+              <a:t>9/16/2017</a:t>
             </a:fld>
             <a:endParaRPr lang="en-US"/>
           </a:p>
@@ -6080,6 +6130,516 @@
           <a:chExt cx="0" cy="0"/>
         </a:xfrm>
       </p:grpSpPr>
+      <p:sp>
+        <p:nvSpPr>
+          <p:cNvPr id="2" name="Rectangle à coins arrondis 1"/>
+          <p:cNvSpPr/>
+          <p:nvPr/>
+        </p:nvSpPr>
+        <p:spPr>
+          <a:xfrm>
+            <a:off x="1629000" y="4385777"/>
+            <a:ext cx="3600000" cy="540000"/>
+          </a:xfrm>
+          <a:prstGeom prst="roundRect">
+            <a:avLst/>
+          </a:prstGeom>
+          <a:solidFill>
+            <a:schemeClr val="bg2">
+              <a:lumMod val="10000"/>
+            </a:schemeClr>
+          </a:solidFill>
+          <a:ln>
+            <a:noFill/>
+          </a:ln>
+          <a:effectLst>
+            <a:outerShdw blurRad="25400" dist="38100" dir="2700000" algn="tl" rotWithShape="0">
+              <a:schemeClr val="tx1">
+                <a:lumMod val="50000"/>
+                <a:lumOff val="50000"/>
+                <a:alpha val="40000"/>
+              </a:schemeClr>
+            </a:outerShdw>
+          </a:effectLst>
+        </p:spPr>
+        <p:style>
+          <a:lnRef idx="2">
+            <a:schemeClr val="accent1">
+              <a:shade val="50000"/>
+            </a:schemeClr>
+          </a:lnRef>
+          <a:fillRef idx="1">
+            <a:schemeClr val="accent1"/>
+          </a:fillRef>
+          <a:effectRef idx="0">
+            <a:schemeClr val="accent1"/>
+          </a:effectRef>
+          <a:fontRef idx="minor">
+            <a:schemeClr val="lt1"/>
+          </a:fontRef>
+        </p:style>
+        <p:txBody>
+          <a:bodyPr rtlCol="0" anchor="ctr"/>
+          <a:lstStyle/>
+          <a:p>
+            <a:pPr algn="ctr"/>
+            <a:r>
+              <a:rPr lang="en-US" sz="1060" dirty="0" smtClean="0">
+                <a:latin typeface="Helvetica Neue" panose="02000503000000020004" pitchFamily="50"/>
+              </a:rPr>
+              <a:t>COGNITIVE ORGANIZATION, MATURITY AND INTELLECTUAL ABILITY</a:t>
+            </a:r>
+            <a:endParaRPr lang="en-US" sz="1060" dirty="0">
+              <a:latin typeface="Helvetica Neue" panose="02000503000000020004" pitchFamily="50"/>
+            </a:endParaRPr>
+          </a:p>
+        </p:txBody>
+      </p:sp>
+      <p:sp>
+        <p:nvSpPr>
+          <p:cNvPr id="18" name="Rectangle à coins arrondis 17"/>
+          <p:cNvSpPr/>
+          <p:nvPr/>
+        </p:nvSpPr>
+        <p:spPr>
+          <a:xfrm>
+            <a:off x="1809000" y="3845777"/>
+            <a:ext cx="3240000" cy="540000"/>
+          </a:xfrm>
+          <a:prstGeom prst="roundRect">
+            <a:avLst/>
+          </a:prstGeom>
+          <a:solidFill>
+            <a:schemeClr val="bg2">
+              <a:lumMod val="25000"/>
+            </a:schemeClr>
+          </a:solidFill>
+          <a:ln>
+            <a:noFill/>
+          </a:ln>
+          <a:effectLst>
+            <a:outerShdw blurRad="25400" dist="38100" dir="2700000" algn="tl" rotWithShape="0">
+              <a:schemeClr val="tx1">
+                <a:lumMod val="50000"/>
+                <a:lumOff val="50000"/>
+                <a:alpha val="40000"/>
+              </a:schemeClr>
+            </a:outerShdw>
+          </a:effectLst>
+        </p:spPr>
+        <p:style>
+          <a:lnRef idx="2">
+            <a:schemeClr val="accent1">
+              <a:shade val="50000"/>
+            </a:schemeClr>
+          </a:lnRef>
+          <a:fillRef idx="1">
+            <a:schemeClr val="accent1"/>
+          </a:fillRef>
+          <a:effectRef idx="0">
+            <a:schemeClr val="accent1"/>
+          </a:effectRef>
+          <a:fontRef idx="minor">
+            <a:schemeClr val="lt1"/>
+          </a:fontRef>
+        </p:style>
+        <p:txBody>
+          <a:bodyPr rtlCol="0" anchor="ctr"/>
+          <a:lstStyle/>
+          <a:p>
+            <a:pPr algn="ctr"/>
+            <a:r>
+              <a:rPr lang="en-US" sz="1060" dirty="0" smtClean="0">
+                <a:latin typeface="Helvetica Neue" panose="02000503000000020004" pitchFamily="50"/>
+              </a:rPr>
+              <a:t>EMOTIONAL EXPRESSION</a:t>
+            </a:r>
+            <a:endParaRPr lang="en-US" sz="1060" dirty="0">
+              <a:latin typeface="Helvetica Neue" panose="02000503000000020004" pitchFamily="50"/>
+            </a:endParaRPr>
+          </a:p>
+        </p:txBody>
+      </p:sp>
+      <p:sp>
+        <p:nvSpPr>
+          <p:cNvPr id="19" name="Rectangle à coins arrondis 18"/>
+          <p:cNvSpPr/>
+          <p:nvPr/>
+        </p:nvSpPr>
+        <p:spPr>
+          <a:xfrm>
+            <a:off x="1989000" y="3305777"/>
+            <a:ext cx="2880000" cy="540000"/>
+          </a:xfrm>
+          <a:prstGeom prst="roundRect">
+            <a:avLst/>
+          </a:prstGeom>
+          <a:solidFill>
+            <a:schemeClr val="bg2">
+              <a:lumMod val="50000"/>
+            </a:schemeClr>
+          </a:solidFill>
+          <a:ln>
+            <a:noFill/>
+          </a:ln>
+          <a:effectLst>
+            <a:outerShdw blurRad="25400" dist="38100" dir="2700000" algn="tl" rotWithShape="0">
+              <a:schemeClr val="tx1">
+                <a:lumMod val="50000"/>
+                <a:lumOff val="50000"/>
+                <a:alpha val="40000"/>
+              </a:schemeClr>
+            </a:outerShdw>
+          </a:effectLst>
+        </p:spPr>
+        <p:style>
+          <a:lnRef idx="2">
+            <a:schemeClr val="accent1">
+              <a:shade val="50000"/>
+            </a:schemeClr>
+          </a:lnRef>
+          <a:fillRef idx="1">
+            <a:schemeClr val="accent1"/>
+          </a:fillRef>
+          <a:effectRef idx="0">
+            <a:schemeClr val="accent1"/>
+          </a:effectRef>
+          <a:fontRef idx="minor">
+            <a:schemeClr val="lt1"/>
+          </a:fontRef>
+        </p:style>
+        <p:txBody>
+          <a:bodyPr rtlCol="0" anchor="ctr"/>
+          <a:lstStyle/>
+          <a:p>
+            <a:pPr algn="ctr"/>
+            <a:r>
+              <a:rPr lang="en-US" sz="1050" dirty="0" smtClean="0">
+                <a:latin typeface="Helvetica Neue" panose="02000503000000020004" pitchFamily="50"/>
+              </a:rPr>
+              <a:t>CULTURE, GENDER AND PERSONALITY</a:t>
+            </a:r>
+            <a:endParaRPr lang="en-US" sz="1050" dirty="0">
+              <a:latin typeface="Helvetica Neue" panose="02000503000000020004" pitchFamily="50"/>
+            </a:endParaRPr>
+          </a:p>
+        </p:txBody>
+      </p:sp>
+      <p:sp>
+        <p:nvSpPr>
+          <p:cNvPr id="20" name="Rectangle à coins arrondis 19"/>
+          <p:cNvSpPr/>
+          <p:nvPr/>
+        </p:nvSpPr>
+        <p:spPr>
+          <a:xfrm>
+            <a:off x="2169000" y="2765777"/>
+            <a:ext cx="2520000" cy="540000"/>
+          </a:xfrm>
+          <a:prstGeom prst="roundRect">
+            <a:avLst/>
+          </a:prstGeom>
+          <a:solidFill>
+            <a:schemeClr val="bg2">
+              <a:lumMod val="75000"/>
+            </a:schemeClr>
+          </a:solidFill>
+          <a:ln>
+            <a:noFill/>
+          </a:ln>
+          <a:effectLst>
+            <a:outerShdw blurRad="25400" dist="38100" dir="2700000" algn="tl" rotWithShape="0">
+              <a:schemeClr val="tx1">
+                <a:lumMod val="50000"/>
+                <a:lumOff val="50000"/>
+                <a:alpha val="40000"/>
+              </a:schemeClr>
+            </a:outerShdw>
+          </a:effectLst>
+        </p:spPr>
+        <p:style>
+          <a:lnRef idx="2">
+            <a:schemeClr val="accent1">
+              <a:shade val="50000"/>
+            </a:schemeClr>
+          </a:lnRef>
+          <a:fillRef idx="1">
+            <a:schemeClr val="accent1"/>
+          </a:fillRef>
+          <a:effectRef idx="0">
+            <a:schemeClr val="accent1"/>
+          </a:effectRef>
+          <a:fontRef idx="minor">
+            <a:schemeClr val="lt1"/>
+          </a:fontRef>
+        </p:style>
+        <p:txBody>
+          <a:bodyPr rtlCol="0" anchor="ctr"/>
+          <a:lstStyle/>
+          <a:p>
+            <a:pPr algn="ctr"/>
+            <a:r>
+              <a:rPr lang="en-US" sz="1040" dirty="0" smtClean="0">
+                <a:solidFill>
+                  <a:schemeClr val="tx1"/>
+                </a:solidFill>
+                <a:latin typeface="Helvetica Neue" panose="02000503000000020004" pitchFamily="50"/>
+              </a:rPr>
+              <a:t>PAST EXPERIENCES AND MEMORY TRACES</a:t>
+            </a:r>
+            <a:endParaRPr lang="en-US" sz="1040" dirty="0">
+              <a:solidFill>
+                <a:schemeClr val="tx1"/>
+              </a:solidFill>
+              <a:latin typeface="Helvetica Neue" panose="02000503000000020004" pitchFamily="50"/>
+            </a:endParaRPr>
+          </a:p>
+        </p:txBody>
+      </p:sp>
+      <p:sp>
+        <p:nvSpPr>
+          <p:cNvPr id="21" name="Rectangle à coins arrondis 20"/>
+          <p:cNvSpPr/>
+          <p:nvPr/>
+        </p:nvSpPr>
+        <p:spPr>
+          <a:xfrm>
+            <a:off x="2349000" y="2225777"/>
+            <a:ext cx="2160000" cy="540000"/>
+          </a:xfrm>
+          <a:prstGeom prst="roundRect">
+            <a:avLst/>
+          </a:prstGeom>
+          <a:solidFill>
+            <a:schemeClr val="bg2">
+              <a:lumMod val="90000"/>
+            </a:schemeClr>
+          </a:solidFill>
+          <a:ln>
+            <a:noFill/>
+          </a:ln>
+          <a:effectLst>
+            <a:outerShdw blurRad="25400" dist="38100" dir="2700000" algn="tl" rotWithShape="0">
+              <a:schemeClr val="tx1">
+                <a:lumMod val="50000"/>
+                <a:lumOff val="50000"/>
+                <a:alpha val="40000"/>
+              </a:schemeClr>
+            </a:outerShdw>
+          </a:effectLst>
+        </p:spPr>
+        <p:style>
+          <a:lnRef idx="2">
+            <a:schemeClr val="accent1">
+              <a:shade val="50000"/>
+            </a:schemeClr>
+          </a:lnRef>
+          <a:fillRef idx="1">
+            <a:schemeClr val="accent1"/>
+          </a:fillRef>
+          <a:effectRef idx="0">
+            <a:schemeClr val="accent1"/>
+          </a:effectRef>
+          <a:fontRef idx="minor">
+            <a:schemeClr val="lt1"/>
+          </a:fontRef>
+        </p:style>
+        <p:txBody>
+          <a:bodyPr rtlCol="0" anchor="ctr"/>
+          <a:lstStyle/>
+          <a:p>
+            <a:pPr algn="ctr"/>
+            <a:r>
+              <a:rPr lang="en-US" sz="1040" dirty="0" smtClean="0">
+                <a:solidFill>
+                  <a:schemeClr val="tx1"/>
+                </a:solidFill>
+                <a:latin typeface="Helvetica Neue" panose="02000503000000020004" pitchFamily="50"/>
+              </a:rPr>
+              <a:t>PRE-SLEEP EXPERIENCES, CONCERNS, MOOD</a:t>
+            </a:r>
+            <a:endParaRPr lang="en-US" sz="1040" dirty="0">
+              <a:solidFill>
+                <a:schemeClr val="tx1"/>
+              </a:solidFill>
+              <a:latin typeface="Helvetica Neue" panose="02000503000000020004" pitchFamily="50"/>
+            </a:endParaRPr>
+          </a:p>
+        </p:txBody>
+      </p:sp>
+      <p:sp>
+        <p:nvSpPr>
+          <p:cNvPr id="22" name="Rectangle à coins arrondis 21"/>
+          <p:cNvSpPr/>
+          <p:nvPr/>
+        </p:nvSpPr>
+        <p:spPr>
+          <a:xfrm>
+            <a:off x="2529000" y="1691179"/>
+            <a:ext cx="1800000" cy="540000"/>
+          </a:xfrm>
+          <a:prstGeom prst="roundRect">
+            <a:avLst/>
+          </a:prstGeom>
+          <a:solidFill>
+            <a:schemeClr val="bg2"/>
+          </a:solidFill>
+          <a:ln>
+            <a:noFill/>
+          </a:ln>
+          <a:effectLst>
+            <a:outerShdw blurRad="25400" dist="38100" dir="2700000" algn="tl" rotWithShape="0">
+              <a:schemeClr val="tx1">
+                <a:lumMod val="50000"/>
+                <a:lumOff val="50000"/>
+                <a:alpha val="40000"/>
+              </a:schemeClr>
+            </a:outerShdw>
+          </a:effectLst>
+        </p:spPr>
+        <p:style>
+          <a:lnRef idx="2">
+            <a:schemeClr val="accent1">
+              <a:shade val="50000"/>
+            </a:schemeClr>
+          </a:lnRef>
+          <a:fillRef idx="1">
+            <a:schemeClr val="accent1"/>
+          </a:fillRef>
+          <a:effectRef idx="0">
+            <a:schemeClr val="accent1"/>
+          </a:effectRef>
+          <a:fontRef idx="minor">
+            <a:schemeClr val="lt1"/>
+          </a:fontRef>
+        </p:style>
+        <p:txBody>
+          <a:bodyPr rtlCol="0" anchor="ctr"/>
+          <a:lstStyle/>
+          <a:p>
+            <a:pPr algn="ctr"/>
+            <a:r>
+              <a:rPr lang="en-US" sz="1030" dirty="0" smtClean="0">
+                <a:solidFill>
+                  <a:schemeClr val="tx1"/>
+                </a:solidFill>
+                <a:latin typeface="Helvetica Neue" panose="02000503000000020004" pitchFamily="50"/>
+              </a:rPr>
+              <a:t>INTERNAL AND EXTERNAL STIMULATION</a:t>
+            </a:r>
+            <a:endParaRPr lang="en-US" sz="1030" dirty="0">
+              <a:solidFill>
+                <a:schemeClr val="tx1"/>
+              </a:solidFill>
+              <a:latin typeface="Helvetica Neue" panose="02000503000000020004" pitchFamily="50"/>
+            </a:endParaRPr>
+          </a:p>
+        </p:txBody>
+      </p:sp>
+      <p:sp>
+        <p:nvSpPr>
+          <p:cNvPr id="3" name="Flèche droite rayée 2"/>
+          <p:cNvSpPr/>
+          <p:nvPr/>
+        </p:nvSpPr>
+        <p:spPr>
+          <a:xfrm rot="17295925">
+            <a:off x="522974" y="2869459"/>
+            <a:ext cx="1677499" cy="742951"/>
+          </a:xfrm>
+          <a:prstGeom prst="stripedRightArrow">
+            <a:avLst>
+              <a:gd name="adj1" fmla="val 54368"/>
+              <a:gd name="adj2" fmla="val 50000"/>
+            </a:avLst>
+          </a:prstGeom>
+          <a:solidFill>
+            <a:schemeClr val="bg1"/>
+          </a:solidFill>
+          <a:ln>
+            <a:solidFill>
+              <a:srgbClr val="212E3B"/>
+            </a:solidFill>
+          </a:ln>
+          <a:effectLst>
+            <a:outerShdw blurRad="25400" dist="38100" dir="2700000" algn="tl" rotWithShape="0">
+              <a:schemeClr val="tx1">
+                <a:lumMod val="50000"/>
+                <a:lumOff val="50000"/>
+                <a:alpha val="40000"/>
+              </a:schemeClr>
+            </a:outerShdw>
+          </a:effectLst>
+        </p:spPr>
+        <p:style>
+          <a:lnRef idx="2">
+            <a:schemeClr val="accent1">
+              <a:shade val="50000"/>
+            </a:schemeClr>
+          </a:lnRef>
+          <a:fillRef idx="1">
+            <a:schemeClr val="accent1"/>
+          </a:fillRef>
+          <a:effectRef idx="0">
+            <a:schemeClr val="accent1"/>
+          </a:effectRef>
+          <a:fontRef idx="minor">
+            <a:schemeClr val="lt1"/>
+          </a:fontRef>
+        </p:style>
+        <p:txBody>
+          <a:bodyPr rtlCol="0" anchor="ctr"/>
+          <a:lstStyle/>
+          <a:p>
+            <a:pPr algn="ctr"/>
+            <a:r>
+              <a:rPr lang="en-US" sz="1100" dirty="0" smtClean="0">
+                <a:solidFill>
+                  <a:schemeClr val="tx1"/>
+                </a:solidFill>
+                <a:latin typeface="Helvetica Neue" panose="02000503000000020004" pitchFamily="50"/>
+              </a:rPr>
+              <a:t>DREAM FORMATION</a:t>
+            </a:r>
+            <a:endParaRPr lang="en-US" sz="1100" dirty="0">
+              <a:solidFill>
+                <a:schemeClr val="tx1"/>
+              </a:solidFill>
+              <a:latin typeface="Helvetica Neue" panose="02000503000000020004" pitchFamily="50"/>
+            </a:endParaRPr>
+          </a:p>
+        </p:txBody>
+      </p:sp>
+    </p:spTree>
+    <p:extLst>
+      <p:ext uri="{BB962C8B-B14F-4D97-AF65-F5344CB8AC3E}">
+        <p14:creationId xmlns:p14="http://schemas.microsoft.com/office/powerpoint/2010/main" val="4117660670"/>
+      </p:ext>
+    </p:extLst>
+  </p:cSld>
+  <p:clrMapOvr>
+    <a:masterClrMapping/>
+  </p:clrMapOvr>
+</p:sld>
+</file>
+
+<file path=ppt/slides/slide2.xml><?xml version="1.0" encoding="utf-8"?>
+<p:sld xmlns:a="http://schemas.openxmlformats.org/drawingml/2006/main" xmlns:r="http://schemas.openxmlformats.org/officeDocument/2006/relationships" xmlns:p="http://schemas.openxmlformats.org/presentationml/2006/main">
+  <p:cSld>
+    <p:spTree>
+      <p:nvGrpSpPr>
+        <p:cNvPr id="1" name=""/>
+        <p:cNvGrpSpPr/>
+        <p:nvPr/>
+      </p:nvGrpSpPr>
+      <p:grpSpPr>
+        <a:xfrm>
+          <a:off x="0" y="0"/>
+          <a:ext cx="0" cy="0"/>
+          <a:chOff x="0" y="0"/>
+          <a:chExt cx="0" cy="0"/>
+        </a:xfrm>
+      </p:grpSpPr>
       <p:graphicFrame>
         <p:nvGraphicFramePr>
           <p:cNvPr id="6" name="Diagramme 5"/>
@@ -6194,7 +6754,7 @@
 <file path=ppt/theme/theme1.xml><?xml version="1.0" encoding="utf-8"?>
 <a:theme xmlns:a="http://schemas.openxmlformats.org/drawingml/2006/main" name="Thème Office">
   <a:themeElements>
-    <a:clrScheme name="Thème Office">
+    <a:clrScheme name="Nuances de gris">
       <a:dk1>
         <a:sysClr val="windowText" lastClr="000000"/>
       </a:dk1>
@@ -6202,34 +6762,34 @@
         <a:sysClr val="window" lastClr="FFFFFF"/>
       </a:lt1>
       <a:dk2>
-        <a:srgbClr val="44546A"/>
+        <a:srgbClr val="000000"/>
       </a:dk2>
       <a:lt2>
-        <a:srgbClr val="E7E6E6"/>
+        <a:srgbClr val="F8F8F8"/>
       </a:lt2>
       <a:accent1>
-        <a:srgbClr val="5B9BD5"/>
+        <a:srgbClr val="DDDDDD"/>
       </a:accent1>
       <a:accent2>
-        <a:srgbClr val="ED7D31"/>
+        <a:srgbClr val="B2B2B2"/>
       </a:accent2>
       <a:accent3>
-        <a:srgbClr val="A5A5A5"/>
+        <a:srgbClr val="969696"/>
       </a:accent3>
       <a:accent4>
-        <a:srgbClr val="FFC000"/>
+        <a:srgbClr val="808080"/>
       </a:accent4>
       <a:accent5>
-        <a:srgbClr val="4472C4"/>
+        <a:srgbClr val="5F5F5F"/>
       </a:accent5>
       <a:accent6>
-        <a:srgbClr val="70AD47"/>
+        <a:srgbClr val="4D4D4D"/>
       </a:accent6>
       <a:hlink>
-        <a:srgbClr val="0563C1"/>
+        <a:srgbClr val="5F5F5F"/>
       </a:hlink>
       <a:folHlink>
-        <a:srgbClr val="954F72"/>
+        <a:srgbClr val="919191"/>
       </a:folHlink>
     </a:clrScheme>
     <a:fontScheme name="Thème Office">

</xml_diff>

<commit_message>
Finished chapter 3 dream content + BW Grandville
</commit_message>
<xml_diff>
--- a/Fig/Intro/Intro_Pyramid_dream_construction/Intro_pyramid_dream.pptx
+++ b/Fig/Intro/Intro_Pyramid_dream_construction/Intro_pyramid_dream.pptx
@@ -1531,579 +1531,6 @@
       <dsp:cNvGrpSpPr/>
     </dsp:nvGrpSpPr>
     <dsp:grpSpPr/>
-    <dsp:sp modelId="{49B298C3-754C-4BBC-B359-38E68CF5E772}">
-      <dsp:nvSpPr>
-        <dsp:cNvPr id="0" name=""/>
-        <dsp:cNvSpPr/>
-      </dsp:nvSpPr>
-      <dsp:spPr>
-        <a:xfrm>
-          <a:off x="170495" y="0"/>
-          <a:ext cx="4428697" cy="4428697"/>
-        </a:xfrm>
-        <a:prstGeom prst="triangle">
-          <a:avLst/>
-        </a:prstGeom>
-        <a:solidFill>
-          <a:srgbClr val="212E3B"/>
-        </a:solidFill>
-        <a:ln w="12700" cap="flat" cmpd="sng" algn="ctr">
-          <a:solidFill>
-            <a:schemeClr val="lt1">
-              <a:hueOff val="0"/>
-              <a:satOff val="0"/>
-              <a:lumOff val="0"/>
-              <a:alphaOff val="0"/>
-            </a:schemeClr>
-          </a:solidFill>
-          <a:prstDash val="solid"/>
-          <a:miter lim="800000"/>
-        </a:ln>
-        <a:effectLst/>
-      </dsp:spPr>
-      <dsp:style>
-        <a:lnRef idx="2">
-          <a:scrgbClr r="0" g="0" b="0"/>
-        </a:lnRef>
-        <a:fillRef idx="1">
-          <a:scrgbClr r="0" g="0" b="0"/>
-        </a:fillRef>
-        <a:effectRef idx="0">
-          <a:scrgbClr r="0" g="0" b="0"/>
-        </a:effectRef>
-        <a:fontRef idx="minor">
-          <a:schemeClr val="lt1"/>
-        </a:fontRef>
-      </dsp:style>
-    </dsp:sp>
-    <dsp:sp modelId="{4301216F-13E4-4E16-A50D-39D6EBC27318}">
-      <dsp:nvSpPr>
-        <dsp:cNvPr id="0" name=""/>
-        <dsp:cNvSpPr/>
-      </dsp:nvSpPr>
-      <dsp:spPr>
-        <a:xfrm>
-          <a:off x="2602115" y="443302"/>
-          <a:ext cx="2878653" cy="449789"/>
-        </a:xfrm>
-        <a:prstGeom prst="roundRect">
-          <a:avLst/>
-        </a:prstGeom>
-        <a:solidFill>
-          <a:srgbClr val="F5F5F5"/>
-        </a:solidFill>
-        <a:ln w="12700" cap="flat" cmpd="sng" algn="ctr">
-          <a:noFill/>
-          <a:prstDash val="solid"/>
-          <a:miter lim="800000"/>
-        </a:ln>
-        <a:effectLst/>
-      </dsp:spPr>
-      <dsp:style>
-        <a:lnRef idx="2">
-          <a:scrgbClr r="0" g="0" b="0"/>
-        </a:lnRef>
-        <a:fillRef idx="1">
-          <a:scrgbClr r="0" g="0" b="0"/>
-        </a:fillRef>
-        <a:effectRef idx="0">
-          <a:scrgbClr r="0" g="0" b="0"/>
-        </a:effectRef>
-        <a:fontRef idx="minor"/>
-      </dsp:style>
-      <dsp:txBody>
-        <a:bodyPr spcFirstLastPara="0" vert="horz" wrap="square" lIns="45720" tIns="45720" rIns="45720" bIns="45720" numCol="1" spcCol="1270" anchor="ctr" anchorCtr="0">
-          <a:noAutofit/>
-        </a:bodyPr>
-        <a:lstStyle/>
-        <a:p>
-          <a:pPr lvl="0" algn="ctr" defTabSz="533400">
-            <a:lnSpc>
-              <a:spcPct val="90000"/>
-            </a:lnSpc>
-            <a:spcBef>
-              <a:spcPct val="0"/>
-            </a:spcBef>
-            <a:spcAft>
-              <a:spcPct val="35000"/>
-            </a:spcAft>
-          </a:pPr>
-          <a:r>
-            <a:rPr lang="en-US" sz="1200" kern="1200" dirty="0" smtClean="0">
-              <a:latin typeface="Open Sans" panose="020B0606030504020204" pitchFamily="34" charset="0"/>
-              <a:ea typeface="Open Sans" panose="020B0606030504020204" pitchFamily="34" charset="0"/>
-              <a:cs typeface="Open Sans" panose="020B0606030504020204" pitchFamily="34" charset="0"/>
-            </a:rPr>
-            <a:t>Internal and external stimulation</a:t>
-          </a:r>
-          <a:endParaRPr lang="en-US" sz="1200" kern="1200" dirty="0">
-            <a:latin typeface="Open Sans" panose="020B0606030504020204" pitchFamily="34" charset="0"/>
-            <a:ea typeface="Open Sans" panose="020B0606030504020204" pitchFamily="34" charset="0"/>
-            <a:cs typeface="Open Sans" panose="020B0606030504020204" pitchFamily="34" charset="0"/>
-          </a:endParaRPr>
-        </a:p>
-      </dsp:txBody>
-      <dsp:txXfrm>
-        <a:off x="2624072" y="465259"/>
-        <a:ext cx="2834739" cy="405875"/>
-      </dsp:txXfrm>
-    </dsp:sp>
-    <dsp:sp modelId="{F9C17BAB-7FFF-4DE9-B179-DE429845E549}">
-      <dsp:nvSpPr>
-        <dsp:cNvPr id="0" name=""/>
-        <dsp:cNvSpPr/>
-      </dsp:nvSpPr>
-      <dsp:spPr>
-        <a:xfrm>
-          <a:off x="2602115" y="949315"/>
-          <a:ext cx="2878653" cy="449789"/>
-        </a:xfrm>
-        <a:prstGeom prst="roundRect">
-          <a:avLst/>
-        </a:prstGeom>
-        <a:solidFill>
-          <a:srgbClr val="E0E0E0"/>
-        </a:solidFill>
-        <a:ln w="12700" cap="flat" cmpd="sng" algn="ctr">
-          <a:noFill/>
-          <a:prstDash val="solid"/>
-          <a:miter lim="800000"/>
-        </a:ln>
-        <a:effectLst/>
-      </dsp:spPr>
-      <dsp:style>
-        <a:lnRef idx="2">
-          <a:scrgbClr r="0" g="0" b="0"/>
-        </a:lnRef>
-        <a:fillRef idx="1">
-          <a:scrgbClr r="0" g="0" b="0"/>
-        </a:fillRef>
-        <a:effectRef idx="0">
-          <a:scrgbClr r="0" g="0" b="0"/>
-        </a:effectRef>
-        <a:fontRef idx="minor"/>
-      </dsp:style>
-      <dsp:txBody>
-        <a:bodyPr spcFirstLastPara="0" vert="horz" wrap="square" lIns="45720" tIns="45720" rIns="45720" bIns="45720" numCol="1" spcCol="1270" anchor="ctr" anchorCtr="0">
-          <a:noAutofit/>
-        </a:bodyPr>
-        <a:lstStyle/>
-        <a:p>
-          <a:pPr lvl="0" algn="ctr" defTabSz="533400">
-            <a:lnSpc>
-              <a:spcPct val="90000"/>
-            </a:lnSpc>
-            <a:spcBef>
-              <a:spcPct val="0"/>
-            </a:spcBef>
-            <a:spcAft>
-              <a:spcPct val="35000"/>
-            </a:spcAft>
-          </a:pPr>
-          <a:r>
-            <a:rPr lang="en-US" sz="1200" kern="1200" dirty="0" smtClean="0">
-              <a:latin typeface="Open Sans" panose="020B0606030504020204" pitchFamily="34" charset="0"/>
-              <a:ea typeface="Open Sans" panose="020B0606030504020204" pitchFamily="34" charset="0"/>
-              <a:cs typeface="Open Sans" panose="020B0606030504020204" pitchFamily="34" charset="0"/>
-            </a:rPr>
-            <a:t>Pre-sleep experiences, concerns, mood</a:t>
-          </a:r>
-          <a:endParaRPr lang="en-US" sz="1200" kern="1200" dirty="0">
-            <a:latin typeface="Open Sans" panose="020B0606030504020204" pitchFamily="34" charset="0"/>
-            <a:ea typeface="Open Sans" panose="020B0606030504020204" pitchFamily="34" charset="0"/>
-            <a:cs typeface="Open Sans" panose="020B0606030504020204" pitchFamily="34" charset="0"/>
-          </a:endParaRPr>
-        </a:p>
-      </dsp:txBody>
-      <dsp:txXfrm>
-        <a:off x="2624072" y="971272"/>
-        <a:ext cx="2834739" cy="405875"/>
-      </dsp:txXfrm>
-    </dsp:sp>
-    <dsp:sp modelId="{F2811051-B329-492F-B986-6C8E22BC00EE}">
-      <dsp:nvSpPr>
-        <dsp:cNvPr id="0" name=""/>
-        <dsp:cNvSpPr/>
-      </dsp:nvSpPr>
-      <dsp:spPr>
-        <a:xfrm>
-          <a:off x="2602115" y="1455328"/>
-          <a:ext cx="2878653" cy="449789"/>
-        </a:xfrm>
-        <a:prstGeom prst="roundRect">
-          <a:avLst/>
-        </a:prstGeom>
-        <a:solidFill>
-          <a:srgbClr val="BDC3C7"/>
-        </a:solidFill>
-        <a:ln w="12700" cap="flat" cmpd="sng" algn="ctr">
-          <a:noFill/>
-          <a:prstDash val="solid"/>
-          <a:miter lim="800000"/>
-        </a:ln>
-        <a:effectLst/>
-      </dsp:spPr>
-      <dsp:style>
-        <a:lnRef idx="2">
-          <a:scrgbClr r="0" g="0" b="0"/>
-        </a:lnRef>
-        <a:fillRef idx="1">
-          <a:scrgbClr r="0" g="0" b="0"/>
-        </a:fillRef>
-        <a:effectRef idx="0">
-          <a:scrgbClr r="0" g="0" b="0"/>
-        </a:effectRef>
-        <a:fontRef idx="minor"/>
-      </dsp:style>
-      <dsp:txBody>
-        <a:bodyPr spcFirstLastPara="0" vert="horz" wrap="square" lIns="45720" tIns="45720" rIns="45720" bIns="45720" numCol="1" spcCol="1270" anchor="ctr" anchorCtr="0">
-          <a:noAutofit/>
-        </a:bodyPr>
-        <a:lstStyle/>
-        <a:p>
-          <a:pPr lvl="0" algn="ctr" defTabSz="533400">
-            <a:lnSpc>
-              <a:spcPct val="90000"/>
-            </a:lnSpc>
-            <a:spcBef>
-              <a:spcPct val="0"/>
-            </a:spcBef>
-            <a:spcAft>
-              <a:spcPct val="35000"/>
-            </a:spcAft>
-          </a:pPr>
-          <a:r>
-            <a:rPr lang="en-US" sz="1200" kern="1200" dirty="0" smtClean="0">
-              <a:latin typeface="Open Sans" panose="020B0606030504020204" pitchFamily="34" charset="0"/>
-              <a:ea typeface="Open Sans" panose="020B0606030504020204" pitchFamily="34" charset="0"/>
-              <a:cs typeface="Open Sans" panose="020B0606030504020204" pitchFamily="34" charset="0"/>
-            </a:rPr>
-            <a:t>Past experiences and memory traces</a:t>
-          </a:r>
-          <a:endParaRPr lang="en-US" sz="1200" kern="1200" dirty="0">
-            <a:latin typeface="Open Sans" panose="020B0606030504020204" pitchFamily="34" charset="0"/>
-            <a:ea typeface="Open Sans" panose="020B0606030504020204" pitchFamily="34" charset="0"/>
-            <a:cs typeface="Open Sans" panose="020B0606030504020204" pitchFamily="34" charset="0"/>
-          </a:endParaRPr>
-        </a:p>
-      </dsp:txBody>
-      <dsp:txXfrm>
-        <a:off x="2624072" y="1477285"/>
-        <a:ext cx="2834739" cy="405875"/>
-      </dsp:txXfrm>
-    </dsp:sp>
-    <dsp:sp modelId="{9B925A78-5840-4717-B2A8-446714F9F6D1}">
-      <dsp:nvSpPr>
-        <dsp:cNvPr id="0" name=""/>
-        <dsp:cNvSpPr/>
-      </dsp:nvSpPr>
-      <dsp:spPr>
-        <a:xfrm>
-          <a:off x="2602115" y="1961341"/>
-          <a:ext cx="2878653" cy="449789"/>
-        </a:xfrm>
-        <a:prstGeom prst="roundRect">
-          <a:avLst/>
-        </a:prstGeom>
-        <a:solidFill>
-          <a:srgbClr val="95A5A6"/>
-        </a:solidFill>
-        <a:ln w="12700" cap="flat" cmpd="sng" algn="ctr">
-          <a:noFill/>
-          <a:prstDash val="solid"/>
-          <a:miter lim="800000"/>
-        </a:ln>
-        <a:effectLst/>
-      </dsp:spPr>
-      <dsp:style>
-        <a:lnRef idx="2">
-          <a:scrgbClr r="0" g="0" b="0"/>
-        </a:lnRef>
-        <a:fillRef idx="1">
-          <a:scrgbClr r="0" g="0" b="0"/>
-        </a:fillRef>
-        <a:effectRef idx="0">
-          <a:scrgbClr r="0" g="0" b="0"/>
-        </a:effectRef>
-        <a:fontRef idx="minor"/>
-      </dsp:style>
-      <dsp:txBody>
-        <a:bodyPr spcFirstLastPara="0" vert="horz" wrap="square" lIns="45720" tIns="45720" rIns="45720" bIns="45720" numCol="1" spcCol="1270" anchor="ctr" anchorCtr="0">
-          <a:noAutofit/>
-        </a:bodyPr>
-        <a:lstStyle/>
-        <a:p>
-          <a:pPr lvl="0" algn="ctr" defTabSz="533400">
-            <a:lnSpc>
-              <a:spcPct val="90000"/>
-            </a:lnSpc>
-            <a:spcBef>
-              <a:spcPct val="0"/>
-            </a:spcBef>
-            <a:spcAft>
-              <a:spcPct val="35000"/>
-            </a:spcAft>
-          </a:pPr>
-          <a:r>
-            <a:rPr lang="en-US" sz="1200" kern="1200" dirty="0" smtClean="0">
-              <a:solidFill>
-                <a:schemeClr val="tx1"/>
-              </a:solidFill>
-              <a:latin typeface="Open Sans" panose="020B0606030504020204" pitchFamily="34" charset="0"/>
-              <a:ea typeface="Open Sans" panose="020B0606030504020204" pitchFamily="34" charset="0"/>
-              <a:cs typeface="Open Sans" panose="020B0606030504020204" pitchFamily="34" charset="0"/>
-            </a:rPr>
-            <a:t>Culture, gender and personality</a:t>
-          </a:r>
-          <a:endParaRPr lang="en-US" sz="1200" kern="1200" dirty="0">
-            <a:solidFill>
-              <a:schemeClr val="tx1"/>
-            </a:solidFill>
-            <a:latin typeface="Open Sans" panose="020B0606030504020204" pitchFamily="34" charset="0"/>
-            <a:ea typeface="Open Sans" panose="020B0606030504020204" pitchFamily="34" charset="0"/>
-            <a:cs typeface="Open Sans" panose="020B0606030504020204" pitchFamily="34" charset="0"/>
-          </a:endParaRPr>
-        </a:p>
-      </dsp:txBody>
-      <dsp:txXfrm>
-        <a:off x="2624072" y="1983298"/>
-        <a:ext cx="2834739" cy="405875"/>
-      </dsp:txXfrm>
-    </dsp:sp>
-    <dsp:sp modelId="{1187B6D0-95FF-4815-8908-8209FC026C04}">
-      <dsp:nvSpPr>
-        <dsp:cNvPr id="0" name=""/>
-        <dsp:cNvSpPr/>
-      </dsp:nvSpPr>
-      <dsp:spPr>
-        <a:xfrm>
-          <a:off x="2602115" y="2467355"/>
-          <a:ext cx="2878653" cy="449789"/>
-        </a:xfrm>
-        <a:prstGeom prst="roundRect">
-          <a:avLst/>
-        </a:prstGeom>
-        <a:solidFill>
-          <a:srgbClr val="7F8C8D"/>
-        </a:solidFill>
-        <a:ln w="12700" cap="flat" cmpd="sng" algn="ctr">
-          <a:noFill/>
-          <a:prstDash val="solid"/>
-          <a:miter lim="800000"/>
-        </a:ln>
-        <a:effectLst/>
-      </dsp:spPr>
-      <dsp:style>
-        <a:lnRef idx="2">
-          <a:scrgbClr r="0" g="0" b="0"/>
-        </a:lnRef>
-        <a:fillRef idx="1">
-          <a:scrgbClr r="0" g="0" b="0"/>
-        </a:fillRef>
-        <a:effectRef idx="0">
-          <a:scrgbClr r="0" g="0" b="0"/>
-        </a:effectRef>
-        <a:fontRef idx="minor"/>
-      </dsp:style>
-      <dsp:txBody>
-        <a:bodyPr spcFirstLastPara="0" vert="horz" wrap="square" lIns="45720" tIns="45720" rIns="45720" bIns="45720" numCol="1" spcCol="1270" anchor="ctr" anchorCtr="0">
-          <a:noAutofit/>
-        </a:bodyPr>
-        <a:lstStyle/>
-        <a:p>
-          <a:pPr lvl="0" algn="ctr" defTabSz="533400">
-            <a:lnSpc>
-              <a:spcPct val="90000"/>
-            </a:lnSpc>
-            <a:spcBef>
-              <a:spcPct val="0"/>
-            </a:spcBef>
-            <a:spcAft>
-              <a:spcPct val="35000"/>
-            </a:spcAft>
-          </a:pPr>
-          <a:r>
-            <a:rPr lang="en-US" sz="1200" kern="1200" dirty="0" smtClean="0">
-              <a:solidFill>
-                <a:schemeClr val="bg1"/>
-              </a:solidFill>
-              <a:latin typeface="Open Sans" panose="020B0606030504020204" pitchFamily="34" charset="0"/>
-              <a:ea typeface="Open Sans" panose="020B0606030504020204" pitchFamily="34" charset="0"/>
-              <a:cs typeface="Open Sans" panose="020B0606030504020204" pitchFamily="34" charset="0"/>
-            </a:rPr>
-            <a:t>Emotional expression</a:t>
-          </a:r>
-          <a:endParaRPr lang="en-US" sz="1200" kern="1200" dirty="0">
-            <a:solidFill>
-              <a:schemeClr val="bg1"/>
-            </a:solidFill>
-            <a:latin typeface="Open Sans" panose="020B0606030504020204" pitchFamily="34" charset="0"/>
-            <a:ea typeface="Open Sans" panose="020B0606030504020204" pitchFamily="34" charset="0"/>
-            <a:cs typeface="Open Sans" panose="020B0606030504020204" pitchFamily="34" charset="0"/>
-          </a:endParaRPr>
-        </a:p>
-      </dsp:txBody>
-      <dsp:txXfrm>
-        <a:off x="2624072" y="2489312"/>
-        <a:ext cx="2834739" cy="405875"/>
-      </dsp:txXfrm>
-    </dsp:sp>
-    <dsp:sp modelId="{2C2FF811-C249-4B4C-97FE-669B87887142}">
-      <dsp:nvSpPr>
-        <dsp:cNvPr id="0" name=""/>
-        <dsp:cNvSpPr/>
-      </dsp:nvSpPr>
-      <dsp:spPr>
-        <a:xfrm>
-          <a:off x="2602115" y="2973368"/>
-          <a:ext cx="2878653" cy="449789"/>
-        </a:xfrm>
-        <a:prstGeom prst="roundRect">
-          <a:avLst/>
-        </a:prstGeom>
-        <a:solidFill>
-          <a:srgbClr val="34495E"/>
-        </a:solidFill>
-        <a:ln w="12700" cap="flat" cmpd="sng" algn="ctr">
-          <a:noFill/>
-          <a:prstDash val="solid"/>
-          <a:miter lim="800000"/>
-        </a:ln>
-        <a:effectLst/>
-      </dsp:spPr>
-      <dsp:style>
-        <a:lnRef idx="2">
-          <a:scrgbClr r="0" g="0" b="0"/>
-        </a:lnRef>
-        <a:fillRef idx="1">
-          <a:scrgbClr r="0" g="0" b="0"/>
-        </a:fillRef>
-        <a:effectRef idx="0">
-          <a:scrgbClr r="0" g="0" b="0"/>
-        </a:effectRef>
-        <a:fontRef idx="minor"/>
-      </dsp:style>
-      <dsp:txBody>
-        <a:bodyPr spcFirstLastPara="0" vert="horz" wrap="square" lIns="45720" tIns="45720" rIns="45720" bIns="45720" numCol="1" spcCol="1270" anchor="ctr" anchorCtr="0">
-          <a:noAutofit/>
-        </a:bodyPr>
-        <a:lstStyle/>
-        <a:p>
-          <a:pPr lvl="0" algn="ctr" defTabSz="533400">
-            <a:lnSpc>
-              <a:spcPct val="90000"/>
-            </a:lnSpc>
-            <a:spcBef>
-              <a:spcPct val="0"/>
-            </a:spcBef>
-            <a:spcAft>
-              <a:spcPct val="35000"/>
-            </a:spcAft>
-          </a:pPr>
-          <a:r>
-            <a:rPr lang="en-US" sz="1200" kern="1200" dirty="0" smtClean="0">
-              <a:solidFill>
-                <a:schemeClr val="bg1"/>
-              </a:solidFill>
-              <a:latin typeface="Open Sans" panose="020B0606030504020204" pitchFamily="34" charset="0"/>
-              <a:ea typeface="Open Sans" panose="020B0606030504020204" pitchFamily="34" charset="0"/>
-              <a:cs typeface="Open Sans" panose="020B0606030504020204" pitchFamily="34" charset="0"/>
-            </a:rPr>
-            <a:t>Cognitive organization, maturity and intellectual ability</a:t>
-          </a:r>
-          <a:endParaRPr lang="en-US" sz="1200" kern="1200" dirty="0">
-            <a:solidFill>
-              <a:schemeClr val="bg1"/>
-            </a:solidFill>
-            <a:latin typeface="Open Sans" panose="020B0606030504020204" pitchFamily="34" charset="0"/>
-            <a:ea typeface="Open Sans" panose="020B0606030504020204" pitchFamily="34" charset="0"/>
-            <a:cs typeface="Open Sans" panose="020B0606030504020204" pitchFamily="34" charset="0"/>
-          </a:endParaRPr>
-        </a:p>
-      </dsp:txBody>
-      <dsp:txXfrm>
-        <a:off x="2624072" y="2995325"/>
-        <a:ext cx="2834739" cy="405875"/>
-      </dsp:txXfrm>
-    </dsp:sp>
-    <dsp:sp modelId="{DA96F333-EE98-489A-979B-E28231987E16}">
-      <dsp:nvSpPr>
-        <dsp:cNvPr id="0" name=""/>
-        <dsp:cNvSpPr/>
-      </dsp:nvSpPr>
-      <dsp:spPr>
-        <a:xfrm>
-          <a:off x="2602115" y="3479381"/>
-          <a:ext cx="2878653" cy="449789"/>
-        </a:xfrm>
-        <a:prstGeom prst="roundRect">
-          <a:avLst/>
-        </a:prstGeom>
-        <a:solidFill>
-          <a:srgbClr val="2C3E50"/>
-        </a:solidFill>
-        <a:ln w="12700" cap="flat" cmpd="sng" algn="ctr">
-          <a:noFill/>
-          <a:prstDash val="solid"/>
-          <a:miter lim="800000"/>
-        </a:ln>
-        <a:effectLst/>
-      </dsp:spPr>
-      <dsp:style>
-        <a:lnRef idx="2">
-          <a:scrgbClr r="0" g="0" b="0"/>
-        </a:lnRef>
-        <a:fillRef idx="1">
-          <a:scrgbClr r="0" g="0" b="0"/>
-        </a:fillRef>
-        <a:effectRef idx="0">
-          <a:scrgbClr r="0" g="0" b="0"/>
-        </a:effectRef>
-        <a:fontRef idx="minor"/>
-      </dsp:style>
-      <dsp:txBody>
-        <a:bodyPr spcFirstLastPara="0" vert="horz" wrap="square" lIns="45720" tIns="45720" rIns="45720" bIns="45720" numCol="1" spcCol="1270" anchor="ctr" anchorCtr="0">
-          <a:noAutofit/>
-        </a:bodyPr>
-        <a:lstStyle/>
-        <a:p>
-          <a:pPr lvl="0" algn="ctr" defTabSz="533400">
-            <a:lnSpc>
-              <a:spcPct val="90000"/>
-            </a:lnSpc>
-            <a:spcBef>
-              <a:spcPct val="0"/>
-            </a:spcBef>
-            <a:spcAft>
-              <a:spcPct val="35000"/>
-            </a:spcAft>
-          </a:pPr>
-          <a:r>
-            <a:rPr lang="en-US" sz="1200" kern="1200" dirty="0" smtClean="0">
-              <a:solidFill>
-                <a:schemeClr val="bg1"/>
-              </a:solidFill>
-              <a:latin typeface="Open Sans" panose="020B0606030504020204" pitchFamily="34" charset="0"/>
-              <a:ea typeface="Open Sans" panose="020B0606030504020204" pitchFamily="34" charset="0"/>
-              <a:cs typeface="Open Sans" panose="020B0606030504020204" pitchFamily="34" charset="0"/>
-            </a:rPr>
-            <a:t>Neurophysiological organization, sleep stages, chronobiological position </a:t>
-          </a:r>
-          <a:endParaRPr lang="en-US" sz="1200" kern="1200" dirty="0">
-            <a:solidFill>
-              <a:schemeClr val="bg1"/>
-            </a:solidFill>
-            <a:latin typeface="Open Sans" panose="020B0606030504020204" pitchFamily="34" charset="0"/>
-            <a:ea typeface="Open Sans" panose="020B0606030504020204" pitchFamily="34" charset="0"/>
-            <a:cs typeface="Open Sans" panose="020B0606030504020204" pitchFamily="34" charset="0"/>
-          </a:endParaRPr>
-        </a:p>
-      </dsp:txBody>
-      <dsp:txXfrm>
-        <a:off x="2624072" y="3501338"/>
-        <a:ext cx="2834739" cy="405875"/>
-      </dsp:txXfrm>
-    </dsp:sp>
   </dsp:spTree>
 </dsp:drawing>
 </file>
@@ -3402,7 +2829,7 @@
           <a:p>
             <a:fld id="{57320BFE-D24B-4309-91F1-16E777D75168}" type="datetimeFigureOut">
               <a:rPr lang="en-US" smtClean="0"/>
-              <a:t>9/16/2017</a:t>
+              <a:t>10/21/2017</a:t>
             </a:fld>
             <a:endParaRPr lang="en-US"/>
           </a:p>
@@ -3572,7 +2999,7 @@
           <a:p>
             <a:fld id="{57320BFE-D24B-4309-91F1-16E777D75168}" type="datetimeFigureOut">
               <a:rPr lang="en-US" smtClean="0"/>
-              <a:t>9/16/2017</a:t>
+              <a:t>10/21/2017</a:t>
             </a:fld>
             <a:endParaRPr lang="en-US"/>
           </a:p>
@@ -3752,7 +3179,7 @@
           <a:p>
             <a:fld id="{57320BFE-D24B-4309-91F1-16E777D75168}" type="datetimeFigureOut">
               <a:rPr lang="en-US" smtClean="0"/>
-              <a:t>9/16/2017</a:t>
+              <a:t>10/21/2017</a:t>
             </a:fld>
             <a:endParaRPr lang="en-US"/>
           </a:p>
@@ -3922,7 +3349,7 @@
           <a:p>
             <a:fld id="{57320BFE-D24B-4309-91F1-16E777D75168}" type="datetimeFigureOut">
               <a:rPr lang="en-US" smtClean="0"/>
-              <a:t>9/16/2017</a:t>
+              <a:t>10/21/2017</a:t>
             </a:fld>
             <a:endParaRPr lang="en-US"/>
           </a:p>
@@ -4166,7 +3593,7 @@
           <a:p>
             <a:fld id="{57320BFE-D24B-4309-91F1-16E777D75168}" type="datetimeFigureOut">
               <a:rPr lang="en-US" smtClean="0"/>
-              <a:t>9/16/2017</a:t>
+              <a:t>10/21/2017</a:t>
             </a:fld>
             <a:endParaRPr lang="en-US"/>
           </a:p>
@@ -4398,7 +3825,7 @@
           <a:p>
             <a:fld id="{57320BFE-D24B-4309-91F1-16E777D75168}" type="datetimeFigureOut">
               <a:rPr lang="en-US" smtClean="0"/>
-              <a:t>9/16/2017</a:t>
+              <a:t>10/21/2017</a:t>
             </a:fld>
             <a:endParaRPr lang="en-US"/>
           </a:p>
@@ -4765,7 +4192,7 @@
           <a:p>
             <a:fld id="{57320BFE-D24B-4309-91F1-16E777D75168}" type="datetimeFigureOut">
               <a:rPr lang="en-US" smtClean="0"/>
-              <a:t>9/16/2017</a:t>
+              <a:t>10/21/2017</a:t>
             </a:fld>
             <a:endParaRPr lang="en-US"/>
           </a:p>
@@ -4883,7 +4310,7 @@
           <a:p>
             <a:fld id="{57320BFE-D24B-4309-91F1-16E777D75168}" type="datetimeFigureOut">
               <a:rPr lang="en-US" smtClean="0"/>
-              <a:t>9/16/2017</a:t>
+              <a:t>10/21/2017</a:t>
             </a:fld>
             <a:endParaRPr lang="en-US"/>
           </a:p>
@@ -4978,7 +4405,7 @@
           <a:p>
             <a:fld id="{57320BFE-D24B-4309-91F1-16E777D75168}" type="datetimeFigureOut">
               <a:rPr lang="en-US" smtClean="0"/>
-              <a:t>9/16/2017</a:t>
+              <a:t>10/21/2017</a:t>
             </a:fld>
             <a:endParaRPr lang="en-US"/>
           </a:p>
@@ -5255,7 +4682,7 @@
           <a:p>
             <a:fld id="{57320BFE-D24B-4309-91F1-16E777D75168}" type="datetimeFigureOut">
               <a:rPr lang="en-US" smtClean="0"/>
-              <a:t>9/16/2017</a:t>
+              <a:t>10/21/2017</a:t>
             </a:fld>
             <a:endParaRPr lang="en-US"/>
           </a:p>
@@ -5512,7 +4939,7 @@
           <a:p>
             <a:fld id="{57320BFE-D24B-4309-91F1-16E777D75168}" type="datetimeFigureOut">
               <a:rPr lang="en-US" smtClean="0"/>
-              <a:t>9/16/2017</a:t>
+              <a:t>10/21/2017</a:t>
             </a:fld>
             <a:endParaRPr lang="en-US"/>
           </a:p>
@@ -5725,7 +5152,7 @@
           <a:p>
             <a:fld id="{57320BFE-D24B-4309-91F1-16E777D75168}" type="datetimeFigureOut">
               <a:rPr lang="en-US" smtClean="0"/>
-              <a:t>9/16/2017</a:t>
+              <a:t>10/21/2017</a:t>
             </a:fld>
             <a:endParaRPr lang="en-US"/>
           </a:p>
@@ -6152,15 +5579,7 @@
           <a:ln>
             <a:noFill/>
           </a:ln>
-          <a:effectLst>
-            <a:outerShdw blurRad="25400" dist="38100" dir="2700000" algn="tl" rotWithShape="0">
-              <a:schemeClr val="tx1">
-                <a:lumMod val="50000"/>
-                <a:lumOff val="50000"/>
-                <a:alpha val="40000"/>
-              </a:schemeClr>
-            </a:outerShdw>
-          </a:effectLst>
+          <a:effectLst/>
         </p:spPr>
         <p:style>
           <a:lnRef idx="2">
@@ -6217,15 +5636,7 @@
           <a:ln>
             <a:noFill/>
           </a:ln>
-          <a:effectLst>
-            <a:outerShdw blurRad="25400" dist="38100" dir="2700000" algn="tl" rotWithShape="0">
-              <a:schemeClr val="tx1">
-                <a:lumMod val="50000"/>
-                <a:lumOff val="50000"/>
-                <a:alpha val="40000"/>
-              </a:schemeClr>
-            </a:outerShdw>
-          </a:effectLst>
+          <a:effectLst/>
         </p:spPr>
         <p:style>
           <a:lnRef idx="2">
@@ -6282,15 +5693,7 @@
           <a:ln>
             <a:noFill/>
           </a:ln>
-          <a:effectLst>
-            <a:outerShdw blurRad="25400" dist="38100" dir="2700000" algn="tl" rotWithShape="0">
-              <a:schemeClr val="tx1">
-                <a:lumMod val="50000"/>
-                <a:lumOff val="50000"/>
-                <a:alpha val="40000"/>
-              </a:schemeClr>
-            </a:outerShdw>
-          </a:effectLst>
+          <a:effectLst/>
         </p:spPr>
         <p:style>
           <a:lnRef idx="2">
@@ -6347,15 +5750,7 @@
           <a:ln>
             <a:noFill/>
           </a:ln>
-          <a:effectLst>
-            <a:outerShdw blurRad="25400" dist="38100" dir="2700000" algn="tl" rotWithShape="0">
-              <a:schemeClr val="tx1">
-                <a:lumMod val="50000"/>
-                <a:lumOff val="50000"/>
-                <a:alpha val="40000"/>
-              </a:schemeClr>
-            </a:outerShdw>
-          </a:effectLst>
+          <a:effectLst/>
         </p:spPr>
         <p:style>
           <a:lnRef idx="2">
@@ -6418,15 +5813,7 @@
           <a:ln>
             <a:noFill/>
           </a:ln>
-          <a:effectLst>
-            <a:outerShdw blurRad="25400" dist="38100" dir="2700000" algn="tl" rotWithShape="0">
-              <a:schemeClr val="tx1">
-                <a:lumMod val="50000"/>
-                <a:lumOff val="50000"/>
-                <a:alpha val="40000"/>
-              </a:schemeClr>
-            </a:outerShdw>
-          </a:effectLst>
+          <a:effectLst/>
         </p:spPr>
         <p:style>
           <a:lnRef idx="2">
@@ -6487,15 +5874,7 @@
           <a:ln>
             <a:noFill/>
           </a:ln>
-          <a:effectLst>
-            <a:outerShdw blurRad="25400" dist="38100" dir="2700000" algn="tl" rotWithShape="0">
-              <a:schemeClr val="tx1">
-                <a:lumMod val="50000"/>
-                <a:lumOff val="50000"/>
-                <a:alpha val="40000"/>
-              </a:schemeClr>
-            </a:outerShdw>
-          </a:effectLst>
+          <a:effectLst/>
         </p:spPr>
         <p:style>
           <a:lnRef idx="2">
@@ -6544,8 +5923,8 @@
         </p:nvSpPr>
         <p:spPr>
           <a:xfrm rot="17295925">
-            <a:off x="522974" y="2869459"/>
-            <a:ext cx="1677499" cy="742951"/>
+            <a:off x="662185" y="2998514"/>
+            <a:ext cx="1656000" cy="504000"/>
           </a:xfrm>
           <a:prstGeom prst="stripedRightArrow">
             <a:avLst>
@@ -6561,15 +5940,7 @@
               <a:srgbClr val="212E3B"/>
             </a:solidFill>
           </a:ln>
-          <a:effectLst>
-            <a:outerShdw blurRad="25400" dist="38100" dir="2700000" algn="tl" rotWithShape="0">
-              <a:schemeClr val="tx1">
-                <a:lumMod val="50000"/>
-                <a:lumOff val="50000"/>
-                <a:alpha val="40000"/>
-              </a:schemeClr>
-            </a:outerShdw>
-          </a:effectLst>
+          <a:effectLst/>
         </p:spPr>
         <p:style>
           <a:lnRef idx="2">
@@ -6593,7 +5964,7 @@
           <a:p>
             <a:pPr algn="ctr"/>
             <a:r>
-              <a:rPr lang="en-US" sz="1100" dirty="0" smtClean="0">
+              <a:rPr lang="en-US" sz="1000" dirty="0" smtClean="0">
                 <a:solidFill>
                   <a:schemeClr val="tx1"/>
                 </a:solidFill>
@@ -6601,7 +5972,7 @@
               </a:rPr>
               <a:t>DREAM FORMATION</a:t>
             </a:r>
-            <a:endParaRPr lang="en-US" sz="1100" dirty="0">
+            <a:endParaRPr lang="en-US" sz="1000" dirty="0">
               <a:solidFill>
                 <a:schemeClr val="tx1"/>
               </a:solidFill>
@@ -6754,42 +6125,42 @@
 <file path=ppt/theme/theme1.xml><?xml version="1.0" encoding="utf-8"?>
 <a:theme xmlns:a="http://schemas.openxmlformats.org/drawingml/2006/main" name="Thème Office">
   <a:themeElements>
-    <a:clrScheme name="Nuances de gris">
+    <a:clrScheme name="Orange">
       <a:dk1>
-        <a:sysClr val="windowText" lastClr="000000"/>
+        <a:srgbClr val="000000"/>
       </a:dk1>
       <a:lt1>
         <a:sysClr val="window" lastClr="FFFFFF"/>
       </a:lt1>
       <a:dk2>
-        <a:srgbClr val="000000"/>
+        <a:srgbClr val="637052"/>
       </a:dk2>
       <a:lt2>
-        <a:srgbClr val="F8F8F8"/>
+        <a:srgbClr val="CCDDEA"/>
       </a:lt2>
       <a:accent1>
-        <a:srgbClr val="DDDDDD"/>
+        <a:srgbClr val="E48312"/>
       </a:accent1>
       <a:accent2>
-        <a:srgbClr val="B2B2B2"/>
+        <a:srgbClr val="BD582C"/>
       </a:accent2>
       <a:accent3>
-        <a:srgbClr val="969696"/>
+        <a:srgbClr val="865640"/>
       </a:accent3>
       <a:accent4>
-        <a:srgbClr val="808080"/>
+        <a:srgbClr val="9B8357"/>
       </a:accent4>
       <a:accent5>
-        <a:srgbClr val="5F5F5F"/>
+        <a:srgbClr val="C2BC80"/>
       </a:accent5>
       <a:accent6>
-        <a:srgbClr val="4D4D4D"/>
+        <a:srgbClr val="94A088"/>
       </a:accent6>
       <a:hlink>
-        <a:srgbClr val="5F5F5F"/>
+        <a:srgbClr val="2998E3"/>
       </a:hlink>
       <a:folHlink>
-        <a:srgbClr val="919191"/>
+        <a:srgbClr val="8C8C8C"/>
       </a:folHlink>
     </a:clrScheme>
     <a:fontScheme name="Thème Office">

</xml_diff>